<commit_message>
Results of some measurements
</commit_message>
<xml_diff>
--- a/doc/GdpComponentPlacement.pptx
+++ b/doc/GdpComponentPlacement.pptx
@@ -3888,7 +3888,7 @@
           <a:p>
             <a:fld id="{93A23C32-7576-4339-8257-BC8E91C8F1B2}" type="datetimeFigureOut">
               <a:rPr lang="en-SI" smtClean="0"/>
-              <a:t>15/01/2025</a:t>
+              <a:t>18/01/2025</a:t>
             </a:fld>
             <a:endParaRPr lang="en-SI"/>
           </a:p>
@@ -4389,7 +4389,7 @@
           <a:p>
             <a:fld id="{C528FD69-204F-4320-AF82-CEF97A3F82D3}" type="datetimeFigureOut">
               <a:rPr lang="en-SI" smtClean="0"/>
-              <a:t>15/01/2025</a:t>
+              <a:t>18/01/2025</a:t>
             </a:fld>
             <a:endParaRPr lang="en-SI"/>
           </a:p>
@@ -4589,7 +4589,7 @@
           <a:p>
             <a:fld id="{C528FD69-204F-4320-AF82-CEF97A3F82D3}" type="datetimeFigureOut">
               <a:rPr lang="en-SI" smtClean="0"/>
-              <a:t>15/01/2025</a:t>
+              <a:t>18/01/2025</a:t>
             </a:fld>
             <a:endParaRPr lang="en-SI"/>
           </a:p>
@@ -4799,7 +4799,7 @@
           <a:p>
             <a:fld id="{C528FD69-204F-4320-AF82-CEF97A3F82D3}" type="datetimeFigureOut">
               <a:rPr lang="en-SI" smtClean="0"/>
-              <a:t>15/01/2025</a:t>
+              <a:t>18/01/2025</a:t>
             </a:fld>
             <a:endParaRPr lang="en-SI"/>
           </a:p>
@@ -4999,7 +4999,7 @@
           <a:p>
             <a:fld id="{C528FD69-204F-4320-AF82-CEF97A3F82D3}" type="datetimeFigureOut">
               <a:rPr lang="en-SI" smtClean="0"/>
-              <a:t>15/01/2025</a:t>
+              <a:t>18/01/2025</a:t>
             </a:fld>
             <a:endParaRPr lang="en-SI"/>
           </a:p>
@@ -5275,7 +5275,7 @@
           <a:p>
             <a:fld id="{C528FD69-204F-4320-AF82-CEF97A3F82D3}" type="datetimeFigureOut">
               <a:rPr lang="en-SI" smtClean="0"/>
-              <a:t>15/01/2025</a:t>
+              <a:t>18/01/2025</a:t>
             </a:fld>
             <a:endParaRPr lang="en-SI"/>
           </a:p>
@@ -5543,7 +5543,7 @@
           <a:p>
             <a:fld id="{C528FD69-204F-4320-AF82-CEF97A3F82D3}" type="datetimeFigureOut">
               <a:rPr lang="en-SI" smtClean="0"/>
-              <a:t>15/01/2025</a:t>
+              <a:t>18/01/2025</a:t>
             </a:fld>
             <a:endParaRPr lang="en-SI"/>
           </a:p>
@@ -5958,7 +5958,7 @@
           <a:p>
             <a:fld id="{C528FD69-204F-4320-AF82-CEF97A3F82D3}" type="datetimeFigureOut">
               <a:rPr lang="en-SI" smtClean="0"/>
-              <a:t>15/01/2025</a:t>
+              <a:t>18/01/2025</a:t>
             </a:fld>
             <a:endParaRPr lang="en-SI"/>
           </a:p>
@@ -6100,7 +6100,7 @@
           <a:p>
             <a:fld id="{C528FD69-204F-4320-AF82-CEF97A3F82D3}" type="datetimeFigureOut">
               <a:rPr lang="en-SI" smtClean="0"/>
-              <a:t>15/01/2025</a:t>
+              <a:t>18/01/2025</a:t>
             </a:fld>
             <a:endParaRPr lang="en-SI"/>
           </a:p>
@@ -6213,7 +6213,7 @@
           <a:p>
             <a:fld id="{C528FD69-204F-4320-AF82-CEF97A3F82D3}" type="datetimeFigureOut">
               <a:rPr lang="en-SI" smtClean="0"/>
-              <a:t>15/01/2025</a:t>
+              <a:t>18/01/2025</a:t>
             </a:fld>
             <a:endParaRPr lang="en-SI"/>
           </a:p>
@@ -6526,7 +6526,7 @@
           <a:p>
             <a:fld id="{C528FD69-204F-4320-AF82-CEF97A3F82D3}" type="datetimeFigureOut">
               <a:rPr lang="en-SI" smtClean="0"/>
-              <a:t>15/01/2025</a:t>
+              <a:t>18/01/2025</a:t>
             </a:fld>
             <a:endParaRPr lang="en-SI"/>
           </a:p>
@@ -6815,7 +6815,7 @@
           <a:p>
             <a:fld id="{C528FD69-204F-4320-AF82-CEF97A3F82D3}" type="datetimeFigureOut">
               <a:rPr lang="en-SI" smtClean="0"/>
-              <a:t>15/01/2025</a:t>
+              <a:t>18/01/2025</a:t>
             </a:fld>
             <a:endParaRPr lang="en-SI"/>
           </a:p>
@@ -7058,7 +7058,7 @@
           <a:p>
             <a:fld id="{C528FD69-204F-4320-AF82-CEF97A3F82D3}" type="datetimeFigureOut">
               <a:rPr lang="en-SI" smtClean="0"/>
-              <a:t>15/01/2025</a:t>
+              <a:t>18/01/2025</a:t>
             </a:fld>
             <a:endParaRPr lang="en-SI"/>
           </a:p>
@@ -15602,14 +15602,14 @@
             <a:r>
               <a:rPr lang="en-US" sz="700" b="1" dirty="0">
                 <a:solidFill>
-                  <a:srgbClr val="FFC000"/>
+                  <a:schemeClr val="tx1"/>
                 </a:solidFill>
               </a:rPr>
-              <a:t>RXX</a:t>
+              <a:t>R52</a:t>
             </a:r>
             <a:endParaRPr lang="en-SI" sz="700" b="1" dirty="0">
               <a:solidFill>
-                <a:srgbClr val="FFC000"/>
+                <a:schemeClr val="tx1"/>
               </a:solidFill>
             </a:endParaRPr>
           </a:p>
@@ -15666,14 +15666,14 @@
             <a:r>
               <a:rPr lang="en-US" sz="700" b="1" dirty="0">
                 <a:solidFill>
-                  <a:srgbClr val="FFC000"/>
+                  <a:schemeClr val="tx1"/>
                 </a:solidFill>
               </a:rPr>
-              <a:t>RXX</a:t>
+              <a:t>R53</a:t>
             </a:r>
             <a:endParaRPr lang="en-SI" sz="700" b="1" dirty="0">
               <a:solidFill>
-                <a:srgbClr val="FFC000"/>
+                <a:schemeClr val="tx1"/>
               </a:solidFill>
             </a:endParaRPr>
           </a:p>
@@ -16496,16 +16496,16 @@
           <a:p>
             <a:pPr algn="ctr"/>
             <a:r>
-              <a:rPr lang="en-US" sz="700" b="1" dirty="0">
-                <a:solidFill>
-                  <a:srgbClr val="FFC000"/>
+              <a:rPr lang="en-US" sz="600" b="1" dirty="0">
+                <a:solidFill>
+                  <a:schemeClr val="tx1"/>
                 </a:solidFill>
               </a:rPr>
-              <a:t>CK11</a:t>
-            </a:r>
-            <a:endParaRPr lang="en-SI" sz="700" b="1" dirty="0">
+              <a:t>SH11</a:t>
+            </a:r>
+            <a:endParaRPr lang="en-SI" sz="600" b="1" dirty="0">
               <a:solidFill>
-                <a:srgbClr val="FFC000"/>
+                <a:schemeClr val="tx1"/>
               </a:solidFill>
             </a:endParaRPr>
           </a:p>
@@ -17077,7 +17077,7 @@
                   <a:schemeClr val="tx1"/>
                 </a:solidFill>
               </a:rPr>
-              <a:t>R25 </a:t>
+              <a:t>R56 </a:t>
             </a:r>
             <a:endParaRPr lang="en-SI" sz="700" b="1" dirty="0">
               <a:solidFill>
@@ -17141,7 +17141,7 @@
                   <a:schemeClr val="tx1"/>
                 </a:solidFill>
               </a:rPr>
-              <a:t>R24</a:t>
+              <a:t>R55</a:t>
             </a:r>
             <a:endParaRPr lang="en-SI" sz="700" b="1" dirty="0">
               <a:solidFill>
@@ -17205,7 +17205,7 @@
                   <a:schemeClr val="tx1"/>
                 </a:solidFill>
               </a:rPr>
-              <a:t>R31 </a:t>
+              <a:t>R25 </a:t>
             </a:r>
             <a:endParaRPr lang="en-SI" sz="700" b="1" dirty="0">
               <a:solidFill>
@@ -17269,7 +17269,7 @@
                   <a:schemeClr val="tx1"/>
                 </a:solidFill>
               </a:rPr>
-              <a:t>R30</a:t>
+              <a:t>R24</a:t>
             </a:r>
             <a:endParaRPr lang="en-SI" sz="700" b="1" dirty="0">
               <a:solidFill>
@@ -18357,7 +18357,7 @@
                   <a:schemeClr val="tx1"/>
                 </a:solidFill>
               </a:rPr>
-              <a:t>R29</a:t>
+              <a:t>R34</a:t>
             </a:r>
             <a:endParaRPr lang="en-SI" sz="700" b="1" dirty="0">
               <a:solidFill>
@@ -18546,14 +18546,14 @@
             <a:r>
               <a:rPr lang="en-US" sz="700" b="1" dirty="0">
                 <a:solidFill>
-                  <a:srgbClr val="FF0000"/>
+                  <a:schemeClr val="tx1"/>
                 </a:solidFill>
               </a:rPr>
-              <a:t>R48</a:t>
+              <a:t>R35</a:t>
             </a:r>
             <a:endParaRPr lang="en-SI" sz="700" b="1" dirty="0">
               <a:solidFill>
-                <a:srgbClr val="FF0000"/>
+                <a:schemeClr val="tx1"/>
               </a:solidFill>
             </a:endParaRPr>
           </a:p>
@@ -18802,10 +18802,18 @@
             <a:r>
               <a:rPr lang="en-US" sz="700" b="1" dirty="0">
                 <a:solidFill>
+                  <a:schemeClr val="tx1"/>
+                </a:solidFill>
+              </a:rPr>
+              <a:t>R48</a:t>
+            </a:r>
+            <a:r>
+              <a:rPr lang="en-US" sz="700" b="1" dirty="0">
+                <a:solidFill>
                   <a:srgbClr val="FFC000"/>
                 </a:solidFill>
               </a:rPr>
-              <a:t>R48 </a:t>
+              <a:t> </a:t>
             </a:r>
             <a:endParaRPr lang="en-SI" sz="700" b="1" dirty="0">
               <a:solidFill>
@@ -18930,14 +18938,14 @@
             <a:r>
               <a:rPr lang="en-US" sz="700" b="1" dirty="0">
                 <a:solidFill>
-                  <a:srgbClr val="FFC000"/>
+                  <a:schemeClr val="tx1"/>
                 </a:solidFill>
               </a:rPr>
-              <a:t>RXX </a:t>
+              <a:t>R49 </a:t>
             </a:r>
             <a:endParaRPr lang="en-SI" sz="700" b="1" dirty="0">
               <a:solidFill>
-                <a:srgbClr val="FFC000"/>
+                <a:schemeClr val="tx1"/>
               </a:solidFill>
             </a:endParaRPr>
           </a:p>
@@ -19122,14 +19130,14 @@
             <a:r>
               <a:rPr lang="en-US" sz="700" b="1" dirty="0">
                 <a:solidFill>
-                  <a:srgbClr val="FFC000"/>
+                  <a:schemeClr val="tx1"/>
                 </a:solidFill>
               </a:rPr>
-              <a:t>RXX </a:t>
+              <a:t>R50 </a:t>
             </a:r>
             <a:endParaRPr lang="en-SI" sz="700" b="1" dirty="0">
               <a:solidFill>
-                <a:srgbClr val="FFC000"/>
+                <a:schemeClr val="tx1"/>
               </a:solidFill>
             </a:endParaRPr>
           </a:p>
@@ -19186,10 +19194,18 @@
             <a:r>
               <a:rPr lang="en-US" sz="700" b="1" dirty="0">
                 <a:solidFill>
+                  <a:schemeClr val="tx1"/>
+                </a:solidFill>
+              </a:rPr>
+              <a:t>R54</a:t>
+            </a:r>
+            <a:r>
+              <a:rPr lang="en-US" sz="700" b="1" dirty="0">
+                <a:solidFill>
                   <a:srgbClr val="FFC000"/>
                 </a:solidFill>
               </a:rPr>
-              <a:t>RXX </a:t>
+              <a:t> </a:t>
             </a:r>
             <a:endParaRPr lang="en-SI" sz="700" b="1" dirty="0">
               <a:solidFill>
@@ -19250,14 +19266,14 @@
             <a:r>
               <a:rPr lang="en-US" sz="700" b="1" dirty="0">
                 <a:solidFill>
-                  <a:srgbClr val="FFC000"/>
+                  <a:schemeClr val="tx1"/>
                 </a:solidFill>
               </a:rPr>
-              <a:t>RXX </a:t>
+              <a:t>R551 </a:t>
             </a:r>
             <a:endParaRPr lang="en-SI" sz="700" b="1" dirty="0">
               <a:solidFill>
-                <a:srgbClr val="FFC000"/>
+                <a:schemeClr val="tx1"/>
               </a:solidFill>
             </a:endParaRPr>
           </a:p>
@@ -19314,14 +19330,14 @@
             <a:r>
               <a:rPr lang="en-US" sz="700" b="1" dirty="0">
                 <a:solidFill>
-                  <a:srgbClr val="FFC000"/>
+                  <a:schemeClr val="tx1"/>
                 </a:solidFill>
               </a:rPr>
-              <a:t>RXX </a:t>
+              <a:t>R36 </a:t>
             </a:r>
             <a:endParaRPr lang="en-SI" sz="700" b="1" dirty="0">
               <a:solidFill>
-                <a:srgbClr val="FFC000"/>
+                <a:schemeClr val="tx1"/>
               </a:solidFill>
             </a:endParaRPr>
           </a:p>
@@ -19570,14 +19586,14 @@
             <a:r>
               <a:rPr lang="en-US" sz="700" b="1" dirty="0">
                 <a:solidFill>
-                  <a:srgbClr val="FFC000"/>
+                  <a:schemeClr val="tx1"/>
                 </a:solidFill>
               </a:rPr>
-              <a:t>RXX </a:t>
+              <a:t>R33 </a:t>
             </a:r>
             <a:endParaRPr lang="en-SI" sz="700" b="1" dirty="0">
               <a:solidFill>
-                <a:srgbClr val="FFC000"/>
+                <a:schemeClr val="tx1"/>
               </a:solidFill>
             </a:endParaRPr>
           </a:p>
@@ -19634,14 +19650,14 @@
             <a:r>
               <a:rPr lang="en-US" sz="700" b="1" dirty="0">
                 <a:solidFill>
-                  <a:srgbClr val="FFC000"/>
+                  <a:schemeClr val="tx1"/>
                 </a:solidFill>
               </a:rPr>
-              <a:t>RXX</a:t>
+              <a:t>R32</a:t>
             </a:r>
             <a:endParaRPr lang="en-SI" sz="700" b="1" dirty="0">
               <a:solidFill>
-                <a:srgbClr val="FFC000"/>
+                <a:schemeClr val="tx1"/>
               </a:solidFill>
             </a:endParaRPr>
           </a:p>
@@ -19762,14 +19778,14 @@
             <a:r>
               <a:rPr lang="en-US" sz="700" b="1" dirty="0">
                 <a:solidFill>
-                  <a:srgbClr val="FFC000"/>
+                  <a:schemeClr val="tx1"/>
                 </a:solidFill>
               </a:rPr>
-              <a:t>RXX</a:t>
+              <a:t>R46</a:t>
             </a:r>
             <a:endParaRPr lang="en-SI" sz="700" b="1" dirty="0">
               <a:solidFill>
-                <a:srgbClr val="FFC000"/>
+                <a:schemeClr val="tx1"/>
               </a:solidFill>
             </a:endParaRPr>
           </a:p>
@@ -19826,14 +19842,14 @@
             <a:r>
               <a:rPr lang="en-US" sz="700" b="1" dirty="0">
                 <a:solidFill>
-                  <a:srgbClr val="FFC000"/>
+                  <a:schemeClr val="tx1"/>
                 </a:solidFill>
               </a:rPr>
-              <a:t>RXX </a:t>
+              <a:t>R45 </a:t>
             </a:r>
             <a:endParaRPr lang="en-SI" sz="700" b="1" dirty="0">
               <a:solidFill>
-                <a:srgbClr val="FFC000"/>
+                <a:schemeClr val="tx1"/>
               </a:solidFill>
             </a:endParaRPr>
           </a:p>
@@ -19890,14 +19906,14 @@
             <a:r>
               <a:rPr lang="en-US" sz="700" b="1" dirty="0">
                 <a:solidFill>
-                  <a:srgbClr val="FFC000"/>
+                  <a:schemeClr val="tx1"/>
                 </a:solidFill>
               </a:rPr>
-              <a:t>RXX</a:t>
+              <a:t>R44</a:t>
             </a:r>
             <a:endParaRPr lang="en-SI" sz="700" b="1" dirty="0">
               <a:solidFill>
-                <a:srgbClr val="FFC000"/>
+                <a:schemeClr val="tx1"/>
               </a:solidFill>
             </a:endParaRPr>
           </a:p>
@@ -19954,14 +19970,14 @@
             <a:r>
               <a:rPr lang="en-US" sz="700" b="1" dirty="0">
                 <a:solidFill>
-                  <a:srgbClr val="FFC000"/>
+                  <a:schemeClr val="tx1"/>
                 </a:solidFill>
               </a:rPr>
-              <a:t>RXX </a:t>
+              <a:t>R43 </a:t>
             </a:r>
             <a:endParaRPr lang="en-SI" sz="700" b="1" dirty="0">
               <a:solidFill>
-                <a:srgbClr val="FFC000"/>
+                <a:schemeClr val="tx1"/>
               </a:solidFill>
             </a:endParaRPr>
           </a:p>
@@ -20018,14 +20034,14 @@
             <a:r>
               <a:rPr lang="en-US" sz="700" b="1" dirty="0">
                 <a:solidFill>
-                  <a:srgbClr val="FFC000"/>
+                  <a:schemeClr val="tx1"/>
                 </a:solidFill>
               </a:rPr>
-              <a:t>RXX</a:t>
+              <a:t>R41</a:t>
             </a:r>
             <a:endParaRPr lang="en-SI" sz="700" b="1" dirty="0">
               <a:solidFill>
-                <a:srgbClr val="FFC000"/>
+                <a:schemeClr val="tx1"/>
               </a:solidFill>
             </a:endParaRPr>
           </a:p>
@@ -20082,14 +20098,14 @@
             <a:r>
               <a:rPr lang="en-US" sz="700" b="1" dirty="0">
                 <a:solidFill>
-                  <a:srgbClr val="FFC000"/>
+                  <a:schemeClr val="tx1"/>
                 </a:solidFill>
               </a:rPr>
-              <a:t>RXX </a:t>
+              <a:t>R40</a:t>
             </a:r>
             <a:endParaRPr lang="en-SI" sz="700" b="1" dirty="0">
               <a:solidFill>
-                <a:srgbClr val="FFC000"/>
+                <a:schemeClr val="tx1"/>
               </a:solidFill>
             </a:endParaRPr>
           </a:p>
@@ -20146,14 +20162,14 @@
             <a:r>
               <a:rPr lang="en-US" sz="700" b="1" dirty="0">
                 <a:solidFill>
-                  <a:srgbClr val="FFC000"/>
+                  <a:schemeClr val="tx1"/>
                 </a:solidFill>
               </a:rPr>
-              <a:t>RXX</a:t>
+              <a:t>R39</a:t>
             </a:r>
             <a:endParaRPr lang="en-SI" sz="700" b="1" dirty="0">
               <a:solidFill>
-                <a:srgbClr val="FFC000"/>
+                <a:schemeClr val="tx1"/>
               </a:solidFill>
             </a:endParaRPr>
           </a:p>
@@ -20210,14 +20226,14 @@
             <a:r>
               <a:rPr lang="en-US" sz="700" b="1" dirty="0">
                 <a:solidFill>
-                  <a:srgbClr val="FFC000"/>
+                  <a:schemeClr val="tx1"/>
                 </a:solidFill>
               </a:rPr>
-              <a:t>RXX </a:t>
+              <a:t>R38</a:t>
             </a:r>
             <a:endParaRPr lang="en-SI" sz="700" b="1" dirty="0">
               <a:solidFill>
-                <a:srgbClr val="FFC000"/>
+                <a:schemeClr val="tx1"/>
               </a:solidFill>
             </a:endParaRPr>
           </a:p>
@@ -20274,14 +20290,14 @@
             <a:r>
               <a:rPr lang="en-US" sz="700" b="1" dirty="0">
                 <a:solidFill>
-                  <a:srgbClr val="FFC000"/>
+                  <a:schemeClr val="tx1"/>
                 </a:solidFill>
               </a:rPr>
-              <a:t>RXX</a:t>
+              <a:t>R37</a:t>
             </a:r>
             <a:endParaRPr lang="en-SI" sz="700" b="1" dirty="0">
               <a:solidFill>
-                <a:srgbClr val="FFC000"/>
+                <a:schemeClr val="tx1"/>
               </a:solidFill>
             </a:endParaRPr>
           </a:p>
@@ -20338,10 +20354,18 @@
             <a:r>
               <a:rPr lang="en-US" sz="700" b="1" dirty="0">
                 <a:solidFill>
+                  <a:schemeClr val="tx1"/>
+                </a:solidFill>
+              </a:rPr>
+              <a:t>R31</a:t>
+            </a:r>
+            <a:r>
+              <a:rPr lang="en-US" sz="700" b="1" dirty="0">
+                <a:solidFill>
                   <a:srgbClr val="FFC000"/>
                 </a:solidFill>
               </a:rPr>
-              <a:t>RXX </a:t>
+              <a:t> </a:t>
             </a:r>
             <a:endParaRPr lang="en-SI" sz="700" b="1" dirty="0">
               <a:solidFill>
@@ -20402,14 +20426,14 @@
             <a:r>
               <a:rPr lang="en-US" sz="700" b="1" dirty="0">
                 <a:solidFill>
-                  <a:srgbClr val="FFC000"/>
+                  <a:schemeClr val="tx1"/>
                 </a:solidFill>
               </a:rPr>
-              <a:t>RXX </a:t>
+              <a:t>R30</a:t>
             </a:r>
             <a:endParaRPr lang="en-SI" sz="700" b="1" dirty="0">
               <a:solidFill>
-                <a:srgbClr val="FFC000"/>
+                <a:schemeClr val="tx1"/>
               </a:solidFill>
             </a:endParaRPr>
           </a:p>
@@ -20466,10 +20490,18 @@
             <a:r>
               <a:rPr lang="en-US" sz="700" b="1" dirty="0">
                 <a:solidFill>
+                  <a:schemeClr val="tx1"/>
+                </a:solidFill>
+              </a:rPr>
+              <a:t>R29</a:t>
+            </a:r>
+            <a:r>
+              <a:rPr lang="en-US" sz="700" b="1" dirty="0">
+                <a:solidFill>
                   <a:srgbClr val="FFC000"/>
                 </a:solidFill>
               </a:rPr>
-              <a:t>RXX </a:t>
+              <a:t> </a:t>
             </a:r>
             <a:endParaRPr lang="en-SI" sz="700" b="1" dirty="0">
               <a:solidFill>
@@ -20530,10 +20562,18 @@
             <a:r>
               <a:rPr lang="en-US" sz="700" b="1" dirty="0">
                 <a:solidFill>
+                  <a:schemeClr val="tx1"/>
+                </a:solidFill>
+              </a:rPr>
+              <a:t>R42</a:t>
+            </a:r>
+            <a:r>
+              <a:rPr lang="en-US" sz="700" b="1" dirty="0">
+                <a:solidFill>
                   <a:srgbClr val="FFC000"/>
                 </a:solidFill>
               </a:rPr>
-              <a:t>RXX </a:t>
+              <a:t> </a:t>
             </a:r>
             <a:endParaRPr lang="en-SI" sz="700" b="1" dirty="0">
               <a:solidFill>
@@ -21232,16 +21272,16 @@
           <a:p>
             <a:pPr algn="ctr"/>
             <a:r>
-              <a:rPr lang="en-US" sz="700" b="1" dirty="0">
-                <a:solidFill>
-                  <a:srgbClr val="FFC000"/>
+              <a:rPr lang="en-US" sz="600" b="1" dirty="0">
+                <a:solidFill>
+                  <a:schemeClr val="tx1"/>
                 </a:solidFill>
               </a:rPr>
-              <a:t>SH2</a:t>
-            </a:r>
-            <a:endParaRPr lang="en-SI" sz="700" b="1" dirty="0">
+              <a:t>SH12</a:t>
+            </a:r>
+            <a:endParaRPr lang="en-SI" sz="600" b="1" dirty="0">
               <a:solidFill>
-                <a:srgbClr val="FFC000"/>
+                <a:schemeClr val="tx1"/>
               </a:solidFill>
             </a:endParaRPr>
           </a:p>

</xml_diff>

<commit_message>
Places SH (SH3 missing)
</commit_message>
<xml_diff>
--- a/doc/GdpComponentPlacement.pptx
+++ b/doc/GdpComponentPlacement.pptx
@@ -3888,7 +3888,7 @@
           <a:p>
             <a:fld id="{93A23C32-7576-4339-8257-BC8E91C8F1B2}" type="datetimeFigureOut">
               <a:rPr lang="en-SI" smtClean="0"/>
-              <a:t>28/01/2025</a:t>
+              <a:t>31/01/2025</a:t>
             </a:fld>
             <a:endParaRPr lang="en-SI"/>
           </a:p>
@@ -4389,7 +4389,7 @@
           <a:p>
             <a:fld id="{C528FD69-204F-4320-AF82-CEF97A3F82D3}" type="datetimeFigureOut">
               <a:rPr lang="en-SI" smtClean="0"/>
-              <a:t>28/01/2025</a:t>
+              <a:t>31/01/2025</a:t>
             </a:fld>
             <a:endParaRPr lang="en-SI"/>
           </a:p>
@@ -4589,7 +4589,7 @@
           <a:p>
             <a:fld id="{C528FD69-204F-4320-AF82-CEF97A3F82D3}" type="datetimeFigureOut">
               <a:rPr lang="en-SI" smtClean="0"/>
-              <a:t>28/01/2025</a:t>
+              <a:t>31/01/2025</a:t>
             </a:fld>
             <a:endParaRPr lang="en-SI"/>
           </a:p>
@@ -4799,7 +4799,7 @@
           <a:p>
             <a:fld id="{C528FD69-204F-4320-AF82-CEF97A3F82D3}" type="datetimeFigureOut">
               <a:rPr lang="en-SI" smtClean="0"/>
-              <a:t>28/01/2025</a:t>
+              <a:t>31/01/2025</a:t>
             </a:fld>
             <a:endParaRPr lang="en-SI"/>
           </a:p>
@@ -4999,7 +4999,7 @@
           <a:p>
             <a:fld id="{C528FD69-204F-4320-AF82-CEF97A3F82D3}" type="datetimeFigureOut">
               <a:rPr lang="en-SI" smtClean="0"/>
-              <a:t>28/01/2025</a:t>
+              <a:t>31/01/2025</a:t>
             </a:fld>
             <a:endParaRPr lang="en-SI"/>
           </a:p>
@@ -5275,7 +5275,7 @@
           <a:p>
             <a:fld id="{C528FD69-204F-4320-AF82-CEF97A3F82D3}" type="datetimeFigureOut">
               <a:rPr lang="en-SI" smtClean="0"/>
-              <a:t>28/01/2025</a:t>
+              <a:t>31/01/2025</a:t>
             </a:fld>
             <a:endParaRPr lang="en-SI"/>
           </a:p>
@@ -5543,7 +5543,7 @@
           <a:p>
             <a:fld id="{C528FD69-204F-4320-AF82-CEF97A3F82D3}" type="datetimeFigureOut">
               <a:rPr lang="en-SI" smtClean="0"/>
-              <a:t>28/01/2025</a:t>
+              <a:t>31/01/2025</a:t>
             </a:fld>
             <a:endParaRPr lang="en-SI"/>
           </a:p>
@@ -5958,7 +5958,7 @@
           <a:p>
             <a:fld id="{C528FD69-204F-4320-AF82-CEF97A3F82D3}" type="datetimeFigureOut">
               <a:rPr lang="en-SI" smtClean="0"/>
-              <a:t>28/01/2025</a:t>
+              <a:t>31/01/2025</a:t>
             </a:fld>
             <a:endParaRPr lang="en-SI"/>
           </a:p>
@@ -6100,7 +6100,7 @@
           <a:p>
             <a:fld id="{C528FD69-204F-4320-AF82-CEF97A3F82D3}" type="datetimeFigureOut">
               <a:rPr lang="en-SI" smtClean="0"/>
-              <a:t>28/01/2025</a:t>
+              <a:t>31/01/2025</a:t>
             </a:fld>
             <a:endParaRPr lang="en-SI"/>
           </a:p>
@@ -6213,7 +6213,7 @@
           <a:p>
             <a:fld id="{C528FD69-204F-4320-AF82-CEF97A3F82D3}" type="datetimeFigureOut">
               <a:rPr lang="en-SI" smtClean="0"/>
-              <a:t>28/01/2025</a:t>
+              <a:t>31/01/2025</a:t>
             </a:fld>
             <a:endParaRPr lang="en-SI"/>
           </a:p>
@@ -6526,7 +6526,7 @@
           <a:p>
             <a:fld id="{C528FD69-204F-4320-AF82-CEF97A3F82D3}" type="datetimeFigureOut">
               <a:rPr lang="en-SI" smtClean="0"/>
-              <a:t>28/01/2025</a:t>
+              <a:t>31/01/2025</a:t>
             </a:fld>
             <a:endParaRPr lang="en-SI"/>
           </a:p>
@@ -6815,7 +6815,7 @@
           <a:p>
             <a:fld id="{C528FD69-204F-4320-AF82-CEF97A3F82D3}" type="datetimeFigureOut">
               <a:rPr lang="en-SI" smtClean="0"/>
-              <a:t>28/01/2025</a:t>
+              <a:t>31/01/2025</a:t>
             </a:fld>
             <a:endParaRPr lang="en-SI"/>
           </a:p>
@@ -7058,7 +7058,7 @@
           <a:p>
             <a:fld id="{C528FD69-204F-4320-AF82-CEF97A3F82D3}" type="datetimeFigureOut">
               <a:rPr lang="en-SI" smtClean="0"/>
-              <a:t>28/01/2025</a:t>
+              <a:t>31/01/2025</a:t>
             </a:fld>
             <a:endParaRPr lang="en-SI"/>
           </a:p>
@@ -7652,14 +7652,14 @@
             <a:r>
               <a:rPr lang="en-US" sz="700" b="1" dirty="0">
                 <a:solidFill>
-                  <a:srgbClr val="FFC000"/>
+                  <a:schemeClr val="tx1"/>
                 </a:solidFill>
               </a:rPr>
-              <a:t>CK10</a:t>
+              <a:t>SH4</a:t>
             </a:r>
             <a:endParaRPr lang="en-SI" sz="700" b="1" dirty="0">
               <a:solidFill>
-                <a:srgbClr val="FFC000"/>
+                <a:schemeClr val="tx1"/>
               </a:solidFill>
             </a:endParaRPr>
           </a:p>
@@ -8228,14 +8228,14 @@
             <a:r>
               <a:rPr lang="en-US" sz="700" b="1" dirty="0">
                 <a:solidFill>
-                  <a:srgbClr val="FFC000"/>
+                  <a:schemeClr val="tx1"/>
                 </a:solidFill>
               </a:rPr>
-              <a:t>CKXX</a:t>
+              <a:t>SH5</a:t>
             </a:r>
             <a:endParaRPr lang="en-SI" sz="700" b="1" dirty="0">
               <a:solidFill>
-                <a:srgbClr val="FFC000"/>
+                <a:schemeClr val="tx1"/>
               </a:solidFill>
             </a:endParaRPr>
           </a:p>
@@ -16306,14 +16306,14 @@
             <a:r>
               <a:rPr lang="en-US" sz="700" b="1" dirty="0">
                 <a:solidFill>
-                  <a:srgbClr val="FFC000"/>
+                  <a:schemeClr val="tx1"/>
                 </a:solidFill>
               </a:rPr>
-              <a:t>SH</a:t>
+              <a:t>SH1</a:t>
             </a:r>
             <a:endParaRPr lang="en-SI" sz="700" b="1" dirty="0">
               <a:solidFill>
-                <a:srgbClr val="FFC000"/>
+                <a:schemeClr val="tx1"/>
               </a:solidFill>
             </a:endParaRPr>
           </a:p>
@@ -16496,14 +16496,14 @@
           <a:p>
             <a:pPr algn="ctr"/>
             <a:r>
-              <a:rPr lang="en-US" sz="600" b="1" dirty="0">
+              <a:rPr lang="en-US" sz="700" b="1" dirty="0">
                 <a:solidFill>
                   <a:schemeClr val="tx1"/>
                 </a:solidFill>
               </a:rPr>
-              <a:t>SH11</a:t>
-            </a:r>
-            <a:endParaRPr lang="en-SI" sz="600" b="1" dirty="0">
+              <a:t>SH6</a:t>
+            </a:r>
+            <a:endParaRPr lang="en-SI" sz="700" b="1" dirty="0">
               <a:solidFill>
                 <a:schemeClr val="tx1"/>
               </a:solidFill>
@@ -16562,14 +16562,14 @@
             <a:r>
               <a:rPr lang="en-US" sz="700" b="1" dirty="0">
                 <a:solidFill>
-                  <a:srgbClr val="FFC000"/>
+                  <a:schemeClr val="tx1"/>
                 </a:solidFill>
               </a:rPr>
-              <a:t>CK11</a:t>
+              <a:t>SH7</a:t>
             </a:r>
             <a:endParaRPr lang="en-SI" sz="700" b="1" dirty="0">
               <a:solidFill>
-                <a:srgbClr val="FFC000"/>
+                <a:schemeClr val="tx1"/>
               </a:solidFill>
             </a:endParaRPr>
           </a:p>
@@ -16626,14 +16626,14 @@
             <a:r>
               <a:rPr lang="en-US" sz="700" b="1" dirty="0">
                 <a:solidFill>
-                  <a:srgbClr val="FFC000"/>
+                  <a:schemeClr val="tx1"/>
                 </a:solidFill>
               </a:rPr>
-              <a:t>CK11</a:t>
+              <a:t>SH8</a:t>
             </a:r>
             <a:endParaRPr lang="en-SI" sz="700" b="1" dirty="0">
               <a:solidFill>
-                <a:srgbClr val="FFC000"/>
+                <a:schemeClr val="tx1"/>
               </a:solidFill>
             </a:endParaRPr>
           </a:p>
@@ -16690,14 +16690,14 @@
             <a:r>
               <a:rPr lang="en-US" sz="700" b="1" dirty="0">
                 <a:solidFill>
-                  <a:srgbClr val="FFC000"/>
+                  <a:schemeClr val="tx1"/>
                 </a:solidFill>
               </a:rPr>
-              <a:t>CK11</a:t>
+              <a:t>SH9</a:t>
             </a:r>
             <a:endParaRPr lang="en-SI" sz="700" b="1" dirty="0">
               <a:solidFill>
-                <a:srgbClr val="FFC000"/>
+                <a:schemeClr val="tx1"/>
               </a:solidFill>
             </a:endParaRPr>
           </a:p>
@@ -20824,16 +20824,16 @@
           <a:p>
             <a:pPr algn="ctr"/>
             <a:r>
-              <a:rPr lang="en-US" sz="700" b="1" dirty="0">
-                <a:solidFill>
-                  <a:srgbClr val="FFC000"/>
+              <a:rPr lang="en-US" sz="600" b="1" dirty="0">
+                <a:solidFill>
+                  <a:schemeClr val="tx1"/>
                 </a:solidFill>
               </a:rPr>
-              <a:t>SH2</a:t>
-            </a:r>
-            <a:endParaRPr lang="en-SI" sz="700" b="1" dirty="0">
+              <a:t>SH15</a:t>
+            </a:r>
+            <a:endParaRPr lang="en-SI" sz="600" b="1" dirty="0">
               <a:solidFill>
-                <a:srgbClr val="FFC000"/>
+                <a:schemeClr val="tx1"/>
               </a:solidFill>
             </a:endParaRPr>
           </a:p>
@@ -20888,16 +20888,16 @@
           <a:p>
             <a:pPr algn="ctr"/>
             <a:r>
-              <a:rPr lang="en-US" sz="700" b="1" dirty="0">
-                <a:solidFill>
-                  <a:srgbClr val="FFC000"/>
+              <a:rPr lang="en-US" sz="600" b="1" dirty="0">
+                <a:solidFill>
+                  <a:schemeClr val="tx1"/>
                 </a:solidFill>
               </a:rPr>
-              <a:t>SH2</a:t>
-            </a:r>
-            <a:endParaRPr lang="en-SI" sz="700" b="1" dirty="0">
+              <a:t>SH19</a:t>
+            </a:r>
+            <a:endParaRPr lang="en-SI" sz="600" b="1" dirty="0">
               <a:solidFill>
-                <a:srgbClr val="FFC000"/>
+                <a:schemeClr val="tx1"/>
               </a:solidFill>
             </a:endParaRPr>
           </a:p>
@@ -20952,16 +20952,16 @@
           <a:p>
             <a:pPr algn="ctr"/>
             <a:r>
-              <a:rPr lang="en-US" sz="700" b="1" dirty="0">
-                <a:solidFill>
-                  <a:srgbClr val="FFC000"/>
+              <a:rPr lang="en-US" sz="600" b="1" dirty="0">
+                <a:solidFill>
+                  <a:schemeClr val="tx1"/>
                 </a:solidFill>
               </a:rPr>
-              <a:t>SH2</a:t>
-            </a:r>
-            <a:endParaRPr lang="en-SI" sz="700" b="1" dirty="0">
+              <a:t>SH18</a:t>
+            </a:r>
+            <a:endParaRPr lang="en-SI" sz="600" b="1" dirty="0">
               <a:solidFill>
-                <a:srgbClr val="FFC000"/>
+                <a:schemeClr val="tx1"/>
               </a:solidFill>
             </a:endParaRPr>
           </a:p>
@@ -21016,16 +21016,16 @@
           <a:p>
             <a:pPr algn="ctr"/>
             <a:r>
-              <a:rPr lang="en-US" sz="700" b="1" dirty="0">
-                <a:solidFill>
-                  <a:srgbClr val="FFC000"/>
+              <a:rPr lang="en-US" sz="600" b="1" dirty="0">
+                <a:solidFill>
+                  <a:schemeClr val="tx1"/>
                 </a:solidFill>
               </a:rPr>
-              <a:t>SH2</a:t>
-            </a:r>
-            <a:endParaRPr lang="en-SI" sz="700" b="1" dirty="0">
+              <a:t>SH17</a:t>
+            </a:r>
+            <a:endParaRPr lang="en-SI" sz="600" b="1" dirty="0">
               <a:solidFill>
-                <a:srgbClr val="FFC000"/>
+                <a:schemeClr val="tx1"/>
               </a:solidFill>
             </a:endParaRPr>
           </a:p>
@@ -21080,16 +21080,16 @@
           <a:p>
             <a:pPr algn="ctr"/>
             <a:r>
-              <a:rPr lang="en-US" sz="700" b="1" dirty="0">
-                <a:solidFill>
-                  <a:srgbClr val="FFC000"/>
+              <a:rPr lang="en-US" sz="600" b="1" dirty="0">
+                <a:solidFill>
+                  <a:schemeClr val="tx1"/>
                 </a:solidFill>
               </a:rPr>
-              <a:t>SH2</a:t>
-            </a:r>
-            <a:endParaRPr lang="en-SI" sz="700" b="1" dirty="0">
+              <a:t>SH16</a:t>
+            </a:r>
+            <a:endParaRPr lang="en-SI" sz="600" b="1" dirty="0">
               <a:solidFill>
-                <a:srgbClr val="FFC000"/>
+                <a:schemeClr val="tx1"/>
               </a:solidFill>
             </a:endParaRPr>
           </a:p>
@@ -21144,16 +21144,16 @@
           <a:p>
             <a:pPr algn="ctr"/>
             <a:r>
-              <a:rPr lang="en-US" sz="700" b="1" dirty="0">
-                <a:solidFill>
-                  <a:srgbClr val="FFC000"/>
+              <a:rPr lang="en-US" sz="600" b="1" dirty="0">
+                <a:solidFill>
+                  <a:schemeClr val="tx1"/>
                 </a:solidFill>
               </a:rPr>
-              <a:t>SH2</a:t>
-            </a:r>
-            <a:endParaRPr lang="en-SI" sz="700" b="1" dirty="0">
+              <a:t>SH14</a:t>
+            </a:r>
+            <a:endParaRPr lang="en-SI" sz="600" b="1" dirty="0">
               <a:solidFill>
-                <a:srgbClr val="FFC000"/>
+                <a:schemeClr val="tx1"/>
               </a:solidFill>
             </a:endParaRPr>
           </a:p>
@@ -21208,18 +21208,13 @@
           <a:p>
             <a:pPr algn="ctr"/>
             <a:r>
-              <a:rPr lang="en-US" sz="700" b="1" dirty="0">
-                <a:solidFill>
-                  <a:srgbClr val="FFC000"/>
+              <a:rPr lang="en-US" sz="600" b="1" dirty="0">
+                <a:solidFill>
+                  <a:schemeClr val="tx1"/>
                 </a:solidFill>
               </a:rPr>
-              <a:t>SH2</a:t>
-            </a:r>
-            <a:endParaRPr lang="en-SI" sz="700" b="1" dirty="0">
-              <a:solidFill>
-                <a:srgbClr val="FFC000"/>
-              </a:solidFill>
-            </a:endParaRPr>
+              <a:t>SH13</a:t>
+            </a:r>
           </a:p>
         </p:txBody>
       </p:sp>
@@ -21336,16 +21331,16 @@
           <a:p>
             <a:pPr algn="ctr"/>
             <a:r>
-              <a:rPr lang="en-US" sz="700" b="1" dirty="0">
-                <a:solidFill>
-                  <a:srgbClr val="FFC000"/>
+              <a:rPr lang="en-US" sz="600" b="1" dirty="0">
+                <a:solidFill>
+                  <a:schemeClr val="tx1"/>
                 </a:solidFill>
               </a:rPr>
-              <a:t>SH2</a:t>
-            </a:r>
-            <a:endParaRPr lang="en-SI" sz="700" b="1" dirty="0">
+              <a:t>SH11</a:t>
+            </a:r>
+            <a:endParaRPr lang="en-SI" sz="600" b="1" dirty="0">
               <a:solidFill>
-                <a:srgbClr val="FFC000"/>
+                <a:schemeClr val="tx1"/>
               </a:solidFill>
             </a:endParaRPr>
           </a:p>
@@ -21400,16 +21395,16 @@
           <a:p>
             <a:pPr algn="ctr"/>
             <a:r>
-              <a:rPr lang="en-US" sz="700" b="1" dirty="0">
-                <a:solidFill>
-                  <a:srgbClr val="FFC000"/>
+              <a:rPr lang="en-US" sz="600" b="1" dirty="0">
+                <a:solidFill>
+                  <a:schemeClr val="tx1"/>
                 </a:solidFill>
               </a:rPr>
-              <a:t>SH2</a:t>
-            </a:r>
-            <a:endParaRPr lang="en-SI" sz="700" b="1" dirty="0">
+              <a:t>SH10</a:t>
+            </a:r>
+            <a:endParaRPr lang="en-SI" sz="600" b="1" dirty="0">
               <a:solidFill>
-                <a:srgbClr val="FFC000"/>
+                <a:schemeClr val="tx1"/>
               </a:solidFill>
             </a:endParaRPr>
           </a:p>

</xml_diff>